<commit_message>
Added missing files from master homework
</commit_message>
<xml_diff>
--- a/SecondYear/Computational Linguistics & NLP/Daniel Holteiu - grupa 507 - Rezumarea Automata a Textelor.pptx
+++ b/SecondYear/Computational Linguistics & NLP/Daniel Holteiu - grupa 507 - Rezumarea Automata a Textelor.pptx
@@ -130,6 +130,11 @@
       </a:defRPr>
     </a:lvl9pPr>
   </p:defaultTextStyle>
+  <p:extLst>
+    <p:ext uri="{EFAFB233-063F-42B5-8137-9DF3F51BA10A}">
+      <p15:sldGuideLst xmlns:p15="http://schemas.microsoft.com/office/powerpoint/2012/main"/>
+    </p:ext>
+  </p:extLst>
 </p:presentation>
 </file>
 
@@ -215,7 +220,7 @@
           <a:p>
             <a:fld id="{6E546CA0-7094-42C5-B77E-027B7C7EAE05}" type="datetimeFigureOut">
               <a:rPr lang="en-US" smtClean="0"/>
-              <a:t>26-Apr-20</a:t>
+              <a:t>13-May-20</a:t>
             </a:fld>
             <a:endParaRPr lang="en-US"/>
           </a:p>
@@ -808,8 +813,21 @@
             </a:r>
             <a:r>
               <a:rPr lang="en-US" dirty="0"/>
-              <a:t> pe news</a:t>
-            </a:r>
+              <a:t> pe </a:t>
+            </a:r>
+            <a:r>
+              <a:rPr lang="en-US" dirty="0" err="1"/>
+              <a:t>articole</a:t>
+            </a:r>
+            <a:r>
+              <a:rPr lang="en-US" dirty="0"/>
+              <a:t> de </a:t>
+            </a:r>
+            <a:r>
+              <a:rPr lang="en-US"/>
+              <a:t>stiri</a:t>
+            </a:r>
+            <a:endParaRPr lang="en-US" dirty="0"/>
           </a:p>
           <a:p>
             <a:r>
@@ -1934,135 +1952,40 @@
           <a:lstStyle/>
           <a:p>
             <a:r>
-              <a:rPr lang="en-US" dirty="0" err="1"/>
-              <a:t>Extrinsenc</a:t>
-            </a:r>
-            <a:r>
               <a:rPr lang="en-US" dirty="0"/>
+              <a:t>Input </a:t>
+            </a:r>
+            <a:r>
+              <a:rPr lang="en-US" dirty="0">
+                <a:sym typeface="Wingdings" panose="05000000000000000000" pitchFamily="2" charset="2"/>
+              </a:rPr>
+              <a:t> </a:t>
+            </a:r>
+            <a:r>
+              <a:rPr lang="en-US" dirty="0" err="1">
+                <a:sym typeface="Wingdings" panose="05000000000000000000" pitchFamily="2" charset="2"/>
+              </a:rPr>
+              <a:t>Fiecare</a:t>
+            </a:r>
+            <a:r>
+              <a:rPr lang="en-US" dirty="0">
+                <a:sym typeface="Wingdings" panose="05000000000000000000" pitchFamily="2" charset="2"/>
+              </a:rPr>
               <a:t> </a:t>
             </a:r>
-          </a:p>
-          <a:p>
-            <a:pPr marL="171450" indent="-171450">
-              <a:buFontTx/>
-              <a:buChar char="-"/>
-            </a:pPr>
-            <a:r>
-              <a:rPr lang="en-US" dirty="0"/>
-              <a:t>2 </a:t>
-            </a:r>
-            <a:r>
-              <a:rPr lang="en-US" dirty="0" err="1"/>
-              <a:t>grupuri</a:t>
+            <a:r>
+              <a:rPr lang="en-US" dirty="0" err="1">
+                <a:sym typeface="Wingdings" panose="05000000000000000000" pitchFamily="2" charset="2"/>
+              </a:rPr>
+              <a:t>cuvant</a:t>
+            </a:r>
+            <a:r>
+              <a:rPr lang="en-US" dirty="0">
+                <a:sym typeface="Wingdings" panose="05000000000000000000" pitchFamily="2" charset="2"/>
+              </a:rPr>
+              <a:t> din document</a:t>
             </a:r>
             <a:endParaRPr lang="en-US" dirty="0"/>
-          </a:p>
-          <a:p>
-            <a:pPr marL="171450" indent="-171450">
-              <a:buFontTx/>
-              <a:buChar char="-"/>
-            </a:pPr>
-            <a:r>
-              <a:rPr lang="en-US" dirty="0"/>
-              <a:t>1 </a:t>
-            </a:r>
-            <a:r>
-              <a:rPr lang="en-US" dirty="0" err="1"/>
-              <a:t>primeste</a:t>
-            </a:r>
-            <a:r>
-              <a:rPr lang="en-US" dirty="0"/>
-              <a:t> </a:t>
-            </a:r>
-            <a:r>
-              <a:rPr lang="en-US" dirty="0" err="1"/>
-              <a:t>textul</a:t>
-            </a:r>
-            <a:r>
-              <a:rPr lang="en-US" dirty="0"/>
-              <a:t>, </a:t>
-            </a:r>
-            <a:r>
-              <a:rPr lang="en-US" dirty="0" err="1"/>
-              <a:t>celalalt</a:t>
-            </a:r>
-            <a:r>
-              <a:rPr lang="en-US" dirty="0"/>
-              <a:t> </a:t>
-            </a:r>
-            <a:r>
-              <a:rPr lang="en-US" dirty="0" err="1"/>
-              <a:t>sumarizarea</a:t>
-            </a:r>
-            <a:endParaRPr lang="en-US" dirty="0"/>
-          </a:p>
-          <a:p>
-            <a:pPr marL="171450" indent="-171450">
-              <a:buFontTx/>
-              <a:buChar char="-"/>
-            </a:pPr>
-            <a:r>
-              <a:rPr lang="en-US" dirty="0"/>
-              <a:t>Se da un “test”</a:t>
-            </a:r>
-          </a:p>
-          <a:p>
-            <a:pPr marL="171450" indent="-171450">
-              <a:buFontTx/>
-              <a:buChar char="-"/>
-            </a:pPr>
-            <a:r>
-              <a:rPr lang="en-US" dirty="0"/>
-              <a:t>Cu cat sunt </a:t>
-            </a:r>
-            <a:r>
-              <a:rPr lang="en-US" dirty="0" err="1"/>
-              <a:t>mai</a:t>
-            </a:r>
-            <a:r>
-              <a:rPr lang="en-US" dirty="0"/>
-              <a:t> </a:t>
-            </a:r>
-            <a:r>
-              <a:rPr lang="en-US" dirty="0" err="1"/>
-              <a:t>apropiate</a:t>
-            </a:r>
-            <a:r>
-              <a:rPr lang="en-US" dirty="0"/>
-              <a:t> </a:t>
-            </a:r>
-            <a:r>
-              <a:rPr lang="en-US" dirty="0" err="1"/>
-              <a:t>rezultatele</a:t>
-            </a:r>
-            <a:r>
-              <a:rPr lang="en-US" dirty="0"/>
-              <a:t> cu </a:t>
-            </a:r>
-            <a:r>
-              <a:rPr lang="en-US" dirty="0" err="1"/>
-              <a:t>atat</a:t>
-            </a:r>
-            <a:r>
-              <a:rPr lang="en-US" dirty="0"/>
-              <a:t> </a:t>
-            </a:r>
-            <a:r>
-              <a:rPr lang="en-US" dirty="0" err="1"/>
-              <a:t>este</a:t>
-            </a:r>
-            <a:r>
-              <a:rPr lang="en-US" dirty="0"/>
-              <a:t> </a:t>
-            </a:r>
-            <a:r>
-              <a:rPr lang="en-US" dirty="0" err="1"/>
-              <a:t>mai</a:t>
-            </a:r>
-            <a:r>
-              <a:rPr lang="en-US" dirty="0"/>
-              <a:t> bine</a:t>
-            </a:r>
           </a:p>
         </p:txBody>
       </p:sp>
@@ -2083,7 +2006,7 @@
           <a:p>
             <a:fld id="{FB5F396E-3E4F-4108-B93C-ABCC834E1DEE}" type="slidenum">
               <a:rPr lang="en-US" smtClean="0"/>
-              <a:t>21</a:t>
+              <a:t>19</a:t>
             </a:fld>
             <a:endParaRPr lang="en-US"/>
           </a:p>
@@ -2092,7 +2015,7 @@
     </p:spTree>
     <p:extLst>
       <p:ext uri="{BB962C8B-B14F-4D97-AF65-F5344CB8AC3E}">
-        <p14:creationId xmlns:p14="http://schemas.microsoft.com/office/powerpoint/2010/main" val="1854079086"/>
+        <p14:creationId xmlns:p14="http://schemas.microsoft.com/office/powerpoint/2010/main" val="3868481546"/>
       </p:ext>
     </p:extLst>
   </p:cSld>
@@ -2147,377 +2070,135 @@
           <a:lstStyle/>
           <a:p>
             <a:r>
+              <a:rPr lang="en-US" dirty="0" err="1"/>
+              <a:t>Extrinsenc</a:t>
+            </a:r>
+            <a:r>
               <a:rPr lang="en-US" dirty="0"/>
-              <a:t>Utility </a:t>
-            </a:r>
-            <a:r>
-              <a:rPr lang="en-US" dirty="0">
-                <a:sym typeface="Wingdings" panose="05000000000000000000" pitchFamily="2" charset="2"/>
-              </a:rPr>
-              <a:t> </a:t>
-            </a:r>
-            <a:r>
-              <a:rPr lang="en-US" dirty="0" err="1">
-                <a:sym typeface="Wingdings" panose="05000000000000000000" pitchFamily="2" charset="2"/>
-              </a:rPr>
-              <a:t>Cazul</a:t>
-            </a:r>
-            <a:r>
-              <a:rPr lang="en-US" dirty="0">
-                <a:sym typeface="Wingdings" panose="05000000000000000000" pitchFamily="2" charset="2"/>
-              </a:rPr>
-              <a:t> in care 2 </a:t>
-            </a:r>
-            <a:r>
-              <a:rPr lang="en-US" dirty="0" err="1">
-                <a:sym typeface="Wingdings" panose="05000000000000000000" pitchFamily="2" charset="2"/>
-              </a:rPr>
-              <a:t>propozitii</a:t>
-            </a:r>
-            <a:r>
-              <a:rPr lang="en-US" dirty="0">
-                <a:sym typeface="Wingdings" panose="05000000000000000000" pitchFamily="2" charset="2"/>
-              </a:rPr>
-              <a:t> sunt </a:t>
-            </a:r>
-            <a:r>
-              <a:rPr lang="en-US" dirty="0" err="1">
-                <a:sym typeface="Wingdings" panose="05000000000000000000" pitchFamily="2" charset="2"/>
-              </a:rPr>
-              <a:t>foarte</a:t>
-            </a:r>
-            <a:r>
-              <a:rPr lang="en-US" dirty="0">
-                <a:sym typeface="Wingdings" panose="05000000000000000000" pitchFamily="2" charset="2"/>
-              </a:rPr>
               <a:t> </a:t>
             </a:r>
-            <a:r>
-              <a:rPr lang="en-US" dirty="0" err="1">
-                <a:sym typeface="Wingdings" panose="05000000000000000000" pitchFamily="2" charset="2"/>
-              </a:rPr>
+          </a:p>
+          <a:p>
+            <a:pPr marL="171450" indent="-171450">
+              <a:buFontTx/>
+              <a:buChar char="-"/>
+            </a:pPr>
+            <a:r>
+              <a:rPr lang="en-US" dirty="0"/>
+              <a:t>2 </a:t>
+            </a:r>
+            <a:r>
+              <a:rPr lang="en-US" dirty="0" err="1"/>
+              <a:t>grupuri</a:t>
+            </a:r>
+            <a:endParaRPr lang="en-US" dirty="0"/>
+          </a:p>
+          <a:p>
+            <a:pPr marL="171450" indent="-171450">
+              <a:buFontTx/>
+              <a:buChar char="-"/>
+            </a:pPr>
+            <a:r>
+              <a:rPr lang="en-US" dirty="0"/>
+              <a:t>1 </a:t>
+            </a:r>
+            <a:r>
+              <a:rPr lang="en-US" dirty="0" err="1"/>
+              <a:t>primeste</a:t>
+            </a:r>
+            <a:r>
+              <a:rPr lang="en-US" dirty="0"/>
+              <a:t> </a:t>
+            </a:r>
+            <a:r>
+              <a:rPr lang="en-US" dirty="0" err="1"/>
+              <a:t>textul</a:t>
+            </a:r>
+            <a:r>
+              <a:rPr lang="en-US" dirty="0"/>
+              <a:t>, </a:t>
+            </a:r>
+            <a:r>
+              <a:rPr lang="en-US" dirty="0" err="1"/>
+              <a:t>celalalt</a:t>
+            </a:r>
+            <a:r>
+              <a:rPr lang="en-US" dirty="0"/>
+              <a:t> </a:t>
+            </a:r>
+            <a:r>
+              <a:rPr lang="en-US" dirty="0" err="1"/>
+              <a:t>sumarizarea</a:t>
+            </a:r>
+            <a:endParaRPr lang="en-US" dirty="0"/>
+          </a:p>
+          <a:p>
+            <a:pPr marL="171450" indent="-171450">
+              <a:buFontTx/>
+              <a:buChar char="-"/>
+            </a:pPr>
+            <a:r>
+              <a:rPr lang="en-US" dirty="0"/>
+              <a:t>Se da un “test”</a:t>
+            </a:r>
+          </a:p>
+          <a:p>
+            <a:pPr marL="171450" indent="-171450">
+              <a:buFontTx/>
+              <a:buChar char="-"/>
+            </a:pPr>
+            <a:r>
+              <a:rPr lang="en-US" dirty="0"/>
+              <a:t>Cu cat sunt </a:t>
+            </a:r>
+            <a:r>
+              <a:rPr lang="en-US" dirty="0" err="1"/>
+              <a:t>mai</a:t>
+            </a:r>
+            <a:r>
+              <a:rPr lang="en-US" dirty="0"/>
+              <a:t> </a:t>
+            </a:r>
+            <a:r>
+              <a:rPr lang="en-US" dirty="0" err="1"/>
               <a:t>apropiate</a:t>
             </a:r>
             <a:r>
-              <a:rPr lang="en-US" dirty="0">
-                <a:sym typeface="Wingdings" panose="05000000000000000000" pitchFamily="2" charset="2"/>
-              </a:rPr>
-              <a:t> ca </a:t>
-            </a:r>
-            <a:r>
-              <a:rPr lang="en-US" dirty="0" err="1">
-                <a:sym typeface="Wingdings" panose="05000000000000000000" pitchFamily="2" charset="2"/>
-              </a:rPr>
-              <a:t>sens</a:t>
-            </a:r>
-            <a:r>
-              <a:rPr lang="en-US" dirty="0">
-                <a:sym typeface="Wingdings" panose="05000000000000000000" pitchFamily="2" charset="2"/>
-              </a:rPr>
+              <a:rPr lang="en-US" dirty="0"/>
               <a:t> </a:t>
             </a:r>
             <a:r>
-              <a:rPr lang="en-US" dirty="0" err="1">
-                <a:sym typeface="Wingdings" panose="05000000000000000000" pitchFamily="2" charset="2"/>
-              </a:rPr>
-              <a:t>si</a:t>
-            </a:r>
-            <a:r>
-              <a:rPr lang="en-US" dirty="0">
-                <a:sym typeface="Wingdings" panose="05000000000000000000" pitchFamily="2" charset="2"/>
-              </a:rPr>
+              <a:rPr lang="en-US" dirty="0" err="1"/>
+              <a:t>rezultatele</a:t>
+            </a:r>
+            <a:r>
+              <a:rPr lang="en-US" dirty="0"/>
+              <a:t> cu </a:t>
+            </a:r>
+            <a:r>
+              <a:rPr lang="en-US" dirty="0" err="1"/>
+              <a:t>atat</a:t>
+            </a:r>
+            <a:r>
+              <a:rPr lang="en-US" dirty="0"/>
               <a:t> </a:t>
             </a:r>
             <a:r>
-              <a:rPr lang="en-US" dirty="0" err="1">
-                <a:sym typeface="Wingdings" panose="05000000000000000000" pitchFamily="2" charset="2"/>
-              </a:rPr>
-              <a:t>factorul</a:t>
-            </a:r>
-            <a:r>
-              <a:rPr lang="en-US" dirty="0">
-                <a:sym typeface="Wingdings" panose="05000000000000000000" pitchFamily="2" charset="2"/>
-              </a:rPr>
+              <a:rPr lang="en-US" dirty="0" err="1"/>
+              <a:t>este</a:t>
+            </a:r>
+            <a:r>
+              <a:rPr lang="en-US" dirty="0"/>
               <a:t> </a:t>
             </a:r>
             <a:r>
-              <a:rPr lang="en-US" dirty="0" err="1">
-                <a:sym typeface="Wingdings" panose="05000000000000000000" pitchFamily="2" charset="2"/>
-              </a:rPr>
-              <a:t>uman</a:t>
-            </a:r>
-            <a:r>
-              <a:rPr lang="en-US" dirty="0">
-                <a:sym typeface="Wingdings" panose="05000000000000000000" pitchFamily="2" charset="2"/>
-              </a:rPr>
-              <a:t> </a:t>
-            </a:r>
-            <a:r>
-              <a:rPr lang="en-US" dirty="0" err="1">
-                <a:sym typeface="Wingdings" panose="05000000000000000000" pitchFamily="2" charset="2"/>
-              </a:rPr>
-              <a:t>alege</a:t>
-            </a:r>
-            <a:r>
-              <a:rPr lang="en-US" dirty="0">
-                <a:sym typeface="Wingdings" panose="05000000000000000000" pitchFamily="2" charset="2"/>
-              </a:rPr>
-              <a:t> una din </a:t>
-            </a:r>
-            <a:r>
-              <a:rPr lang="en-US" dirty="0" err="1">
-                <a:sym typeface="Wingdings" panose="05000000000000000000" pitchFamily="2" charset="2"/>
-              </a:rPr>
-              <a:t>ele</a:t>
-            </a:r>
-            <a:r>
-              <a:rPr lang="en-US" dirty="0">
-                <a:sym typeface="Wingdings" panose="05000000000000000000" pitchFamily="2" charset="2"/>
-              </a:rPr>
-              <a:t>, </a:t>
-            </a:r>
-            <a:r>
-              <a:rPr lang="en-US" dirty="0" err="1">
-                <a:sym typeface="Wingdings" panose="05000000000000000000" pitchFamily="2" charset="2"/>
-              </a:rPr>
-              <a:t>dar</a:t>
-            </a:r>
-            <a:r>
-              <a:rPr lang="en-US" dirty="0">
-                <a:sym typeface="Wingdings" panose="05000000000000000000" pitchFamily="2" charset="2"/>
-              </a:rPr>
-              <a:t> </a:t>
-            </a:r>
-            <a:r>
-              <a:rPr lang="en-US" dirty="0" err="1">
-                <a:sym typeface="Wingdings" panose="05000000000000000000" pitchFamily="2" charset="2"/>
-              </a:rPr>
-              <a:t>sumarizarea</a:t>
-            </a:r>
-            <a:r>
-              <a:rPr lang="en-US" dirty="0">
-                <a:sym typeface="Wingdings" panose="05000000000000000000" pitchFamily="2" charset="2"/>
-              </a:rPr>
-              <a:t> automata pe </a:t>
-            </a:r>
-            <a:r>
-              <a:rPr lang="en-US" dirty="0" err="1">
-                <a:sym typeface="Wingdings" panose="05000000000000000000" pitchFamily="2" charset="2"/>
-              </a:rPr>
-              <a:t>cealalata</a:t>
-            </a:r>
-            <a:r>
-              <a:rPr lang="en-US" dirty="0">
-                <a:sym typeface="Wingdings" panose="05000000000000000000" pitchFamily="2" charset="2"/>
-              </a:rPr>
-              <a:t>.</a:t>
-            </a:r>
-          </a:p>
-          <a:p>
-            <a:r>
-              <a:rPr lang="en-US" dirty="0" err="1">
-                <a:sym typeface="Wingdings" panose="05000000000000000000" pitchFamily="2" charset="2"/>
-              </a:rPr>
-              <a:t>Astfel</a:t>
-            </a:r>
-            <a:r>
-              <a:rPr lang="en-US" dirty="0">
-                <a:sym typeface="Wingdings" panose="05000000000000000000" pitchFamily="2" charset="2"/>
-              </a:rPr>
-              <a:t> </a:t>
-            </a:r>
-            <a:r>
-              <a:rPr lang="en-US" dirty="0" err="1">
-                <a:sym typeface="Wingdings" panose="05000000000000000000" pitchFamily="2" charset="2"/>
-              </a:rPr>
-              <a:t>putem</a:t>
-            </a:r>
-            <a:r>
-              <a:rPr lang="en-US" dirty="0">
-                <a:sym typeface="Wingdings" panose="05000000000000000000" pitchFamily="2" charset="2"/>
-              </a:rPr>
-              <a:t> </a:t>
-            </a:r>
-            <a:r>
-              <a:rPr lang="en-US" dirty="0" err="1">
-                <a:sym typeface="Wingdings" panose="05000000000000000000" pitchFamily="2" charset="2"/>
-              </a:rPr>
-              <a:t>avea</a:t>
-            </a:r>
-            <a:r>
-              <a:rPr lang="en-US" dirty="0">
-                <a:sym typeface="Wingdings" panose="05000000000000000000" pitchFamily="2" charset="2"/>
-              </a:rPr>
-              <a:t>, </a:t>
-            </a:r>
-            <a:r>
-              <a:rPr lang="en-US" dirty="0" err="1">
-                <a:sym typeface="Wingdings" panose="05000000000000000000" pitchFamily="2" charset="2"/>
-              </a:rPr>
-              <a:t>spre</a:t>
-            </a:r>
-            <a:r>
-              <a:rPr lang="en-US" dirty="0">
-                <a:sym typeface="Wingdings" panose="05000000000000000000" pitchFamily="2" charset="2"/>
-              </a:rPr>
-              <a:t> </a:t>
-            </a:r>
-            <a:r>
-              <a:rPr lang="en-US" dirty="0" err="1">
-                <a:sym typeface="Wingdings" panose="05000000000000000000" pitchFamily="2" charset="2"/>
-              </a:rPr>
-              <a:t>exemplu</a:t>
-            </a:r>
-            <a:r>
-              <a:rPr lang="en-US" dirty="0">
-                <a:sym typeface="Wingdings" panose="05000000000000000000" pitchFamily="2" charset="2"/>
-              </a:rPr>
-              <a:t>, un </a:t>
-            </a:r>
-            <a:r>
-              <a:rPr lang="en-US" dirty="0" err="1">
-                <a:sym typeface="Wingdings" panose="05000000000000000000" pitchFamily="2" charset="2"/>
-              </a:rPr>
-              <a:t>scor</a:t>
-            </a:r>
-            <a:r>
-              <a:rPr lang="en-US" dirty="0">
-                <a:sym typeface="Wingdings" panose="05000000000000000000" pitchFamily="2" charset="2"/>
-              </a:rPr>
-              <a:t> de 19 vs un </a:t>
-            </a:r>
-            <a:r>
-              <a:rPr lang="en-US" dirty="0" err="1">
-                <a:sym typeface="Wingdings" panose="05000000000000000000" pitchFamily="2" charset="2"/>
-              </a:rPr>
-              <a:t>scor</a:t>
-            </a:r>
-            <a:r>
-              <a:rPr lang="en-US" dirty="0">
-                <a:sym typeface="Wingdings" panose="05000000000000000000" pitchFamily="2" charset="2"/>
-              </a:rPr>
-              <a:t> de 18 </a:t>
-            </a:r>
-            <a:r>
-              <a:rPr lang="en-US" dirty="0" err="1">
-                <a:sym typeface="Wingdings" panose="05000000000000000000" pitchFamily="2" charset="2"/>
-              </a:rPr>
-              <a:t>deci</a:t>
-            </a:r>
-            <a:r>
-              <a:rPr lang="en-US" dirty="0">
-                <a:sym typeface="Wingdings" panose="05000000000000000000" pitchFamily="2" charset="2"/>
-              </a:rPr>
-              <a:t> </a:t>
-            </a:r>
-            <a:r>
-              <a:rPr lang="en-US" dirty="0" err="1">
-                <a:sym typeface="Wingdings" panose="05000000000000000000" pitchFamily="2" charset="2"/>
-              </a:rPr>
-              <a:t>ambele</a:t>
-            </a:r>
-            <a:r>
-              <a:rPr lang="en-US" dirty="0">
-                <a:sym typeface="Wingdings" panose="05000000000000000000" pitchFamily="2" charset="2"/>
-              </a:rPr>
-              <a:t> sunt </a:t>
-            </a:r>
-            <a:r>
-              <a:rPr lang="en-US" dirty="0" err="1">
-                <a:sym typeface="Wingdings" panose="05000000000000000000" pitchFamily="2" charset="2"/>
-              </a:rPr>
-              <a:t>aproape</a:t>
-            </a:r>
-            <a:r>
-              <a:rPr lang="en-US" dirty="0">
-                <a:sym typeface="Wingdings" panose="05000000000000000000" pitchFamily="2" charset="2"/>
-              </a:rPr>
-              <a:t> la </a:t>
-            </a:r>
-            <a:r>
-              <a:rPr lang="en-US" dirty="0" err="1">
-                <a:sym typeface="Wingdings" panose="05000000000000000000" pitchFamily="2" charset="2"/>
-              </a:rPr>
-              <a:t>fel</a:t>
-            </a:r>
-            <a:r>
-              <a:rPr lang="en-US" dirty="0">
-                <a:sym typeface="Wingdings" panose="05000000000000000000" pitchFamily="2" charset="2"/>
-              </a:rPr>
-              <a:t> de </a:t>
-            </a:r>
-            <a:r>
-              <a:rPr lang="en-US" dirty="0" err="1">
-                <a:sym typeface="Wingdings" panose="05000000000000000000" pitchFamily="2" charset="2"/>
-              </a:rPr>
-              <a:t>bune</a:t>
-            </a:r>
-            <a:endParaRPr lang="en-US" dirty="0">
-              <a:sym typeface="Wingdings" panose="05000000000000000000" pitchFamily="2" charset="2"/>
-            </a:endParaRPr>
-          </a:p>
-          <a:p>
-            <a:r>
-              <a:rPr lang="en-US" dirty="0">
-                <a:sym typeface="Wingdings" panose="05000000000000000000" pitchFamily="2" charset="2"/>
-              </a:rPr>
-              <a:t>ROUGE-N  Set de </a:t>
-            </a:r>
-            <a:r>
-              <a:rPr lang="en-US" dirty="0" err="1">
-                <a:sym typeface="Wingdings" panose="05000000000000000000" pitchFamily="2" charset="2"/>
-              </a:rPr>
-              <a:t>sumarizari</a:t>
-            </a:r>
-            <a:r>
-              <a:rPr lang="en-US" dirty="0">
-                <a:sym typeface="Wingdings" panose="05000000000000000000" pitchFamily="2" charset="2"/>
-              </a:rPr>
-              <a:t> </a:t>
-            </a:r>
-            <a:r>
-              <a:rPr lang="en-US" dirty="0" err="1">
-                <a:sym typeface="Wingdings" panose="05000000000000000000" pitchFamily="2" charset="2"/>
-              </a:rPr>
-              <a:t>folosind</a:t>
-            </a:r>
-            <a:r>
-              <a:rPr lang="en-US" dirty="0">
-                <a:sym typeface="Wingdings" panose="05000000000000000000" pitchFamily="2" charset="2"/>
-              </a:rPr>
-              <a:t> n-</a:t>
-            </a:r>
-            <a:r>
-              <a:rPr lang="en-US" dirty="0" err="1">
-                <a:sym typeface="Wingdings" panose="05000000000000000000" pitchFamily="2" charset="2"/>
-              </a:rPr>
-              <a:t>grame</a:t>
-            </a:r>
-            <a:r>
-              <a:rPr lang="en-US" dirty="0">
-                <a:sym typeface="Wingdings" panose="05000000000000000000" pitchFamily="2" charset="2"/>
-              </a:rPr>
-              <a:t> care se </a:t>
-            </a:r>
-            <a:r>
-              <a:rPr lang="en-US" dirty="0" err="1">
-                <a:sym typeface="Wingdings" panose="05000000000000000000" pitchFamily="2" charset="2"/>
-              </a:rPr>
-              <a:t>suprapun</a:t>
-            </a:r>
-            <a:r>
-              <a:rPr lang="en-US" dirty="0">
-                <a:sym typeface="Wingdings" panose="05000000000000000000" pitchFamily="2" charset="2"/>
-              </a:rPr>
-              <a:t> in </a:t>
-            </a:r>
-            <a:r>
-              <a:rPr lang="en-US" dirty="0" err="1">
-                <a:sym typeface="Wingdings" panose="05000000000000000000" pitchFamily="2" charset="2"/>
-              </a:rPr>
-              <a:t>documente</a:t>
-            </a:r>
-            <a:endParaRPr lang="en-US" dirty="0"/>
+              <a:rPr lang="en-US" dirty="0" err="1"/>
+              <a:t>mai</a:t>
+            </a:r>
+            <a:r>
+              <a:rPr lang="en-US" dirty="0"/>
+              <a:t> bine</a:t>
+            </a:r>
           </a:p>
         </p:txBody>
       </p:sp>
@@ -2538,7 +2219,7 @@
           <a:p>
             <a:fld id="{FB5F396E-3E4F-4108-B93C-ABCC834E1DEE}" type="slidenum">
               <a:rPr lang="en-US" smtClean="0"/>
-              <a:t>22</a:t>
+              <a:t>21</a:t>
             </a:fld>
             <a:endParaRPr lang="en-US"/>
           </a:p>
@@ -2547,7 +2228,7 @@
     </p:spTree>
     <p:extLst>
       <p:ext uri="{BB962C8B-B14F-4D97-AF65-F5344CB8AC3E}">
-        <p14:creationId xmlns:p14="http://schemas.microsoft.com/office/powerpoint/2010/main" val="1876810525"/>
+        <p14:creationId xmlns:p14="http://schemas.microsoft.com/office/powerpoint/2010/main" val="1854079086"/>
       </p:ext>
     </p:extLst>
   </p:cSld>
@@ -2602,53 +2283,377 @@
           <a:lstStyle/>
           <a:p>
             <a:r>
-              <a:rPr lang="en-US" dirty="0" err="1"/>
-              <a:t>Domeniu</a:t>
-            </a:r>
-            <a:r>
               <a:rPr lang="en-US" dirty="0"/>
+              <a:t>Utility </a:t>
+            </a:r>
+            <a:r>
+              <a:rPr lang="en-US" dirty="0">
+                <a:sym typeface="Wingdings" panose="05000000000000000000" pitchFamily="2" charset="2"/>
+              </a:rPr>
+              <a:t> </a:t>
+            </a:r>
+            <a:r>
+              <a:rPr lang="en-US" dirty="0" err="1">
+                <a:sym typeface="Wingdings" panose="05000000000000000000" pitchFamily="2" charset="2"/>
+              </a:rPr>
+              <a:t>Cazul</a:t>
+            </a:r>
+            <a:r>
+              <a:rPr lang="en-US" dirty="0">
+                <a:sym typeface="Wingdings" panose="05000000000000000000" pitchFamily="2" charset="2"/>
+              </a:rPr>
+              <a:t> in care 2 </a:t>
+            </a:r>
+            <a:r>
+              <a:rPr lang="en-US" dirty="0" err="1">
+                <a:sym typeface="Wingdings" panose="05000000000000000000" pitchFamily="2" charset="2"/>
+              </a:rPr>
+              <a:t>propozitii</a:t>
+            </a:r>
+            <a:r>
+              <a:rPr lang="en-US" dirty="0">
+                <a:sym typeface="Wingdings" panose="05000000000000000000" pitchFamily="2" charset="2"/>
+              </a:rPr>
+              <a:t> sunt </a:t>
+            </a:r>
+            <a:r>
+              <a:rPr lang="en-US" dirty="0" err="1">
+                <a:sym typeface="Wingdings" panose="05000000000000000000" pitchFamily="2" charset="2"/>
+              </a:rPr>
+              <a:t>foarte</a:t>
+            </a:r>
+            <a:r>
+              <a:rPr lang="en-US" dirty="0">
+                <a:sym typeface="Wingdings" panose="05000000000000000000" pitchFamily="2" charset="2"/>
+              </a:rPr>
+              <a:t> </a:t>
+            </a:r>
+            <a:r>
+              <a:rPr lang="en-US" dirty="0" err="1">
+                <a:sym typeface="Wingdings" panose="05000000000000000000" pitchFamily="2" charset="2"/>
+              </a:rPr>
+              <a:t>apropiate</a:t>
+            </a:r>
+            <a:r>
+              <a:rPr lang="en-US" dirty="0">
+                <a:sym typeface="Wingdings" panose="05000000000000000000" pitchFamily="2" charset="2"/>
+              </a:rPr>
+              <a:t> ca </a:t>
+            </a:r>
+            <a:r>
+              <a:rPr lang="en-US" dirty="0" err="1">
+                <a:sym typeface="Wingdings" panose="05000000000000000000" pitchFamily="2" charset="2"/>
+              </a:rPr>
+              <a:t>sens</a:t>
+            </a:r>
+            <a:r>
+              <a:rPr lang="en-US" dirty="0">
+                <a:sym typeface="Wingdings" panose="05000000000000000000" pitchFamily="2" charset="2"/>
+              </a:rPr>
+              <a:t> </a:t>
+            </a:r>
+            <a:r>
+              <a:rPr lang="en-US" dirty="0" err="1">
+                <a:sym typeface="Wingdings" panose="05000000000000000000" pitchFamily="2" charset="2"/>
+              </a:rPr>
+              <a:t>si</a:t>
+            </a:r>
+            <a:r>
+              <a:rPr lang="en-US" dirty="0">
+                <a:sym typeface="Wingdings" panose="05000000000000000000" pitchFamily="2" charset="2"/>
+              </a:rPr>
+              <a:t> </a:t>
+            </a:r>
+            <a:r>
+              <a:rPr lang="en-US" dirty="0" err="1">
+                <a:sym typeface="Wingdings" panose="05000000000000000000" pitchFamily="2" charset="2"/>
+              </a:rPr>
+              <a:t>factorul</a:t>
+            </a:r>
+            <a:r>
+              <a:rPr lang="en-US" dirty="0">
+                <a:sym typeface="Wingdings" panose="05000000000000000000" pitchFamily="2" charset="2"/>
+              </a:rPr>
+              <a:t> </a:t>
+            </a:r>
+            <a:r>
+              <a:rPr lang="en-US" dirty="0" err="1">
+                <a:sym typeface="Wingdings" panose="05000000000000000000" pitchFamily="2" charset="2"/>
+              </a:rPr>
+              <a:t>uman</a:t>
+            </a:r>
+            <a:r>
+              <a:rPr lang="en-US" dirty="0">
+                <a:sym typeface="Wingdings" panose="05000000000000000000" pitchFamily="2" charset="2"/>
+              </a:rPr>
+              <a:t> </a:t>
+            </a:r>
+            <a:r>
+              <a:rPr lang="en-US" dirty="0" err="1">
+                <a:sym typeface="Wingdings" panose="05000000000000000000" pitchFamily="2" charset="2"/>
+              </a:rPr>
+              <a:t>alege</a:t>
+            </a:r>
+            <a:r>
+              <a:rPr lang="en-US" dirty="0">
+                <a:sym typeface="Wingdings" panose="05000000000000000000" pitchFamily="2" charset="2"/>
+              </a:rPr>
+              <a:t> una din </a:t>
+            </a:r>
+            <a:r>
+              <a:rPr lang="en-US" dirty="0" err="1">
+                <a:sym typeface="Wingdings" panose="05000000000000000000" pitchFamily="2" charset="2"/>
+              </a:rPr>
+              <a:t>ele</a:t>
+            </a:r>
+            <a:r>
+              <a:rPr lang="en-US" dirty="0">
+                <a:sym typeface="Wingdings" panose="05000000000000000000" pitchFamily="2" charset="2"/>
+              </a:rPr>
+              <a:t>, </a:t>
+            </a:r>
+            <a:r>
+              <a:rPr lang="en-US" dirty="0" err="1">
+                <a:sym typeface="Wingdings" panose="05000000000000000000" pitchFamily="2" charset="2"/>
+              </a:rPr>
+              <a:t>dar</a:t>
+            </a:r>
+            <a:r>
+              <a:rPr lang="en-US" dirty="0">
+                <a:sym typeface="Wingdings" panose="05000000000000000000" pitchFamily="2" charset="2"/>
+              </a:rPr>
+              <a:t> </a:t>
+            </a:r>
+            <a:r>
+              <a:rPr lang="en-US" dirty="0" err="1">
+                <a:sym typeface="Wingdings" panose="05000000000000000000" pitchFamily="2" charset="2"/>
+              </a:rPr>
+              <a:t>sumarizarea</a:t>
+            </a:r>
+            <a:r>
+              <a:rPr lang="en-US" dirty="0">
+                <a:sym typeface="Wingdings" panose="05000000000000000000" pitchFamily="2" charset="2"/>
+              </a:rPr>
+              <a:t> automata pe </a:t>
+            </a:r>
+            <a:r>
+              <a:rPr lang="en-US" dirty="0" err="1">
+                <a:sym typeface="Wingdings" panose="05000000000000000000" pitchFamily="2" charset="2"/>
+              </a:rPr>
+              <a:t>cealalata</a:t>
+            </a:r>
+            <a:r>
+              <a:rPr lang="en-US" dirty="0">
+                <a:sym typeface="Wingdings" panose="05000000000000000000" pitchFamily="2" charset="2"/>
+              </a:rPr>
+              <a:t>.</a:t>
+            </a:r>
+          </a:p>
+          <a:p>
+            <a:r>
+              <a:rPr lang="en-US" dirty="0" err="1">
+                <a:sym typeface="Wingdings" panose="05000000000000000000" pitchFamily="2" charset="2"/>
+              </a:rPr>
+              <a:t>Astfel</a:t>
+            </a:r>
+            <a:r>
+              <a:rPr lang="en-US" dirty="0">
+                <a:sym typeface="Wingdings" panose="05000000000000000000" pitchFamily="2" charset="2"/>
+              </a:rPr>
+              <a:t> </a:t>
+            </a:r>
+            <a:r>
+              <a:rPr lang="en-US" dirty="0" err="1">
+                <a:sym typeface="Wingdings" panose="05000000000000000000" pitchFamily="2" charset="2"/>
+              </a:rPr>
+              <a:t>putem</a:t>
+            </a:r>
+            <a:r>
+              <a:rPr lang="en-US" dirty="0">
+                <a:sym typeface="Wingdings" panose="05000000000000000000" pitchFamily="2" charset="2"/>
+              </a:rPr>
+              <a:t> </a:t>
+            </a:r>
+            <a:r>
+              <a:rPr lang="en-US" dirty="0" err="1">
+                <a:sym typeface="Wingdings" panose="05000000000000000000" pitchFamily="2" charset="2"/>
+              </a:rPr>
+              <a:t>avea</a:t>
+            </a:r>
+            <a:r>
+              <a:rPr lang="en-US" dirty="0">
+                <a:sym typeface="Wingdings" panose="05000000000000000000" pitchFamily="2" charset="2"/>
+              </a:rPr>
+              <a:t>, </a:t>
+            </a:r>
+            <a:r>
+              <a:rPr lang="en-US" dirty="0" err="1">
+                <a:sym typeface="Wingdings" panose="05000000000000000000" pitchFamily="2" charset="2"/>
+              </a:rPr>
+              <a:t>spre</a:t>
+            </a:r>
+            <a:r>
+              <a:rPr lang="en-US" dirty="0">
+                <a:sym typeface="Wingdings" panose="05000000000000000000" pitchFamily="2" charset="2"/>
+              </a:rPr>
+              <a:t> </a:t>
+            </a:r>
+            <a:r>
+              <a:rPr lang="en-US" dirty="0" err="1">
+                <a:sym typeface="Wingdings" panose="05000000000000000000" pitchFamily="2" charset="2"/>
+              </a:rPr>
+              <a:t>exemplu</a:t>
+            </a:r>
+            <a:r>
+              <a:rPr lang="en-US" dirty="0">
+                <a:sym typeface="Wingdings" panose="05000000000000000000" pitchFamily="2" charset="2"/>
+              </a:rPr>
+              <a:t>, un </a:t>
+            </a:r>
+            <a:r>
+              <a:rPr lang="en-US" dirty="0" err="1">
+                <a:sym typeface="Wingdings" panose="05000000000000000000" pitchFamily="2" charset="2"/>
+              </a:rPr>
+              <a:t>scor</a:t>
+            </a:r>
+            <a:r>
+              <a:rPr lang="en-US" dirty="0">
+                <a:sym typeface="Wingdings" panose="05000000000000000000" pitchFamily="2" charset="2"/>
+              </a:rPr>
+              <a:t> de 19 vs un </a:t>
+            </a:r>
+            <a:r>
+              <a:rPr lang="en-US" dirty="0" err="1">
+                <a:sym typeface="Wingdings" panose="05000000000000000000" pitchFamily="2" charset="2"/>
+              </a:rPr>
+              <a:t>scor</a:t>
+            </a:r>
+            <a:r>
+              <a:rPr lang="en-US" dirty="0">
+                <a:sym typeface="Wingdings" panose="05000000000000000000" pitchFamily="2" charset="2"/>
+              </a:rPr>
+              <a:t> de 18 </a:t>
+            </a:r>
+            <a:r>
+              <a:rPr lang="en-US" dirty="0" err="1">
+                <a:sym typeface="Wingdings" panose="05000000000000000000" pitchFamily="2" charset="2"/>
+              </a:rPr>
+              <a:t>deci</a:t>
+            </a:r>
+            <a:r>
+              <a:rPr lang="en-US" dirty="0">
+                <a:sym typeface="Wingdings" panose="05000000000000000000" pitchFamily="2" charset="2"/>
+              </a:rPr>
+              <a:t> </a:t>
+            </a:r>
+            <a:r>
+              <a:rPr lang="en-US" dirty="0" err="1">
+                <a:sym typeface="Wingdings" panose="05000000000000000000" pitchFamily="2" charset="2"/>
+              </a:rPr>
+              <a:t>ambele</a:t>
+            </a:r>
+            <a:r>
+              <a:rPr lang="en-US" dirty="0">
+                <a:sym typeface="Wingdings" panose="05000000000000000000" pitchFamily="2" charset="2"/>
+              </a:rPr>
+              <a:t> sunt </a:t>
+            </a:r>
+            <a:r>
+              <a:rPr lang="en-US" dirty="0" err="1">
+                <a:sym typeface="Wingdings" panose="05000000000000000000" pitchFamily="2" charset="2"/>
+              </a:rPr>
+              <a:t>aproape</a:t>
+            </a:r>
+            <a:r>
+              <a:rPr lang="en-US" dirty="0">
+                <a:sym typeface="Wingdings" panose="05000000000000000000" pitchFamily="2" charset="2"/>
+              </a:rPr>
+              <a:t> la </a:t>
+            </a:r>
+            <a:r>
+              <a:rPr lang="en-US" dirty="0" err="1">
+                <a:sym typeface="Wingdings" panose="05000000000000000000" pitchFamily="2" charset="2"/>
+              </a:rPr>
+              <a:t>fel</a:t>
+            </a:r>
+            <a:r>
+              <a:rPr lang="en-US" dirty="0">
+                <a:sym typeface="Wingdings" panose="05000000000000000000" pitchFamily="2" charset="2"/>
+              </a:rPr>
+              <a:t> de </a:t>
+            </a:r>
+            <a:r>
+              <a:rPr lang="en-US" dirty="0" err="1">
+                <a:sym typeface="Wingdings" panose="05000000000000000000" pitchFamily="2" charset="2"/>
+              </a:rPr>
+              <a:t>bune</a:t>
+            </a:r>
+            <a:endParaRPr lang="en-US" dirty="0">
+              <a:sym typeface="Wingdings" panose="05000000000000000000" pitchFamily="2" charset="2"/>
+            </a:endParaRPr>
+          </a:p>
+          <a:p>
+            <a:r>
+              <a:rPr lang="en-US" dirty="0">
+                <a:sym typeface="Wingdings" panose="05000000000000000000" pitchFamily="2" charset="2"/>
+              </a:rPr>
+              <a:t>ROUGE-N  Set de </a:t>
+            </a:r>
+            <a:r>
+              <a:rPr lang="en-US" dirty="0" err="1">
+                <a:sym typeface="Wingdings" panose="05000000000000000000" pitchFamily="2" charset="2"/>
+              </a:rPr>
+              <a:t>sumarizari</a:t>
+            </a:r>
+            <a:r>
+              <a:rPr lang="en-US" dirty="0">
+                <a:sym typeface="Wingdings" panose="05000000000000000000" pitchFamily="2" charset="2"/>
+              </a:rPr>
+              <a:t> </a:t>
+            </a:r>
+            <a:r>
+              <a:rPr lang="en-US" dirty="0" err="1">
+                <a:sym typeface="Wingdings" panose="05000000000000000000" pitchFamily="2" charset="2"/>
+              </a:rPr>
+              <a:t>folosind</a:t>
+            </a:r>
+            <a:r>
+              <a:rPr lang="en-US" dirty="0">
+                <a:sym typeface="Wingdings" panose="05000000000000000000" pitchFamily="2" charset="2"/>
+              </a:rPr>
+              <a:t> n-</a:t>
+            </a:r>
+            <a:r>
+              <a:rPr lang="en-US" dirty="0" err="1">
+                <a:sym typeface="Wingdings" panose="05000000000000000000" pitchFamily="2" charset="2"/>
+              </a:rPr>
+              <a:t>grame</a:t>
+            </a:r>
+            <a:r>
+              <a:rPr lang="en-US" dirty="0">
+                <a:sym typeface="Wingdings" panose="05000000000000000000" pitchFamily="2" charset="2"/>
+              </a:rPr>
+              <a:t> care se </a:t>
+            </a:r>
+            <a:r>
+              <a:rPr lang="en-US" dirty="0" err="1">
+                <a:sym typeface="Wingdings" panose="05000000000000000000" pitchFamily="2" charset="2"/>
+              </a:rPr>
+              <a:t>suprapun</a:t>
+            </a:r>
+            <a:r>
+              <a:rPr lang="en-US" dirty="0">
+                <a:sym typeface="Wingdings" panose="05000000000000000000" pitchFamily="2" charset="2"/>
+              </a:rPr>
               <a:t> in </a:t>
             </a:r>
             <a:r>
-              <a:rPr lang="en-US" dirty="0" err="1"/>
-              <a:t>dezvoltate</a:t>
-            </a:r>
-            <a:r>
-              <a:rPr lang="en-US" dirty="0"/>
-              <a:t> </a:t>
-            </a:r>
-            <a:r>
-              <a:rPr lang="en-US" dirty="0" err="1"/>
-              <a:t>avand</a:t>
-            </a:r>
-            <a:r>
-              <a:rPr lang="en-US" dirty="0"/>
-              <a:t> in </a:t>
-            </a:r>
-            <a:r>
-              <a:rPr lang="en-US" dirty="0" err="1"/>
-              <a:t>vedere</a:t>
-            </a:r>
-            <a:r>
-              <a:rPr lang="en-US" dirty="0"/>
-              <a:t> </a:t>
-            </a:r>
-            <a:r>
-              <a:rPr lang="en-US" dirty="0" err="1"/>
-              <a:t>cresterea</a:t>
-            </a:r>
-            <a:r>
-              <a:rPr lang="en-US" dirty="0"/>
-              <a:t> </a:t>
-            </a:r>
-            <a:r>
-              <a:rPr lang="en-US" dirty="0" err="1"/>
-              <a:t>datelor</a:t>
-            </a:r>
-            <a:endParaRPr lang="en-US"/>
-          </a:p>
-          <a:p>
-            <a:endParaRPr lang="en-US"/>
+              <a:rPr lang="en-US" dirty="0" err="1">
+                <a:sym typeface="Wingdings" panose="05000000000000000000" pitchFamily="2" charset="2"/>
+              </a:rPr>
+              <a:t>documente</a:t>
+            </a:r>
+            <a:endParaRPr lang="en-US" dirty="0"/>
           </a:p>
         </p:txBody>
       </p:sp>
@@ -2669,7 +2674,7 @@
           <a:p>
             <a:fld id="{FB5F396E-3E4F-4108-B93C-ABCC834E1DEE}" type="slidenum">
               <a:rPr lang="en-US" smtClean="0"/>
-              <a:t>23</a:t>
+              <a:t>22</a:t>
             </a:fld>
             <a:endParaRPr lang="en-US"/>
           </a:p>
@@ -2678,7 +2683,7 @@
     </p:spTree>
     <p:extLst>
       <p:ext uri="{BB962C8B-B14F-4D97-AF65-F5344CB8AC3E}">
-        <p14:creationId xmlns:p14="http://schemas.microsoft.com/office/powerpoint/2010/main" val="4024023047"/>
+        <p14:creationId xmlns:p14="http://schemas.microsoft.com/office/powerpoint/2010/main" val="1876810525"/>
       </p:ext>
     </p:extLst>
   </p:cSld>
@@ -2873,6 +2878,137 @@
     <p:extLst>
       <p:ext uri="{BB962C8B-B14F-4D97-AF65-F5344CB8AC3E}">
         <p14:creationId xmlns:p14="http://schemas.microsoft.com/office/powerpoint/2010/main" val="2906262314"/>
+      </p:ext>
+    </p:extLst>
+  </p:cSld>
+  <p:clrMapOvr>
+    <a:masterClrMapping/>
+  </p:clrMapOvr>
+</p:notes>
+</file>
+
+<file path=ppt/notesSlides/notesSlide20.xml><?xml version="1.0" encoding="utf-8"?>
+<p:notes xmlns:a="http://schemas.openxmlformats.org/drawingml/2006/main" xmlns:r="http://schemas.openxmlformats.org/officeDocument/2006/relationships" xmlns:p="http://schemas.openxmlformats.org/presentationml/2006/main">
+  <p:cSld>
+    <p:spTree>
+      <p:nvGrpSpPr>
+        <p:cNvPr id="1" name=""/>
+        <p:cNvGrpSpPr/>
+        <p:nvPr/>
+      </p:nvGrpSpPr>
+      <p:grpSpPr>
+        <a:xfrm>
+          <a:off x="0" y="0"/>
+          <a:ext cx="0" cy="0"/>
+          <a:chOff x="0" y="0"/>
+          <a:chExt cx="0" cy="0"/>
+        </a:xfrm>
+      </p:grpSpPr>
+      <p:sp>
+        <p:nvSpPr>
+          <p:cNvPr id="2" name="Slide Image Placeholder 1"/>
+          <p:cNvSpPr>
+            <a:spLocks noGrp="1" noRot="1" noChangeAspect="1"/>
+          </p:cNvSpPr>
+          <p:nvPr>
+            <p:ph type="sldImg"/>
+          </p:nvPr>
+        </p:nvSpPr>
+        <p:spPr/>
+      </p:sp>
+      <p:sp>
+        <p:nvSpPr>
+          <p:cNvPr id="3" name="Notes Placeholder 2"/>
+          <p:cNvSpPr>
+            <a:spLocks noGrp="1"/>
+          </p:cNvSpPr>
+          <p:nvPr>
+            <p:ph type="body" idx="1"/>
+          </p:nvPr>
+        </p:nvSpPr>
+        <p:spPr/>
+        <p:txBody>
+          <a:bodyPr/>
+          <a:lstStyle/>
+          <a:p>
+            <a:r>
+              <a:rPr lang="en-US" dirty="0" err="1"/>
+              <a:t>Domeniu</a:t>
+            </a:r>
+            <a:r>
+              <a:rPr lang="en-US" dirty="0"/>
+              <a:t> in </a:t>
+            </a:r>
+            <a:r>
+              <a:rPr lang="en-US" dirty="0" err="1"/>
+              <a:t>dezvoltate</a:t>
+            </a:r>
+            <a:r>
+              <a:rPr lang="en-US" dirty="0"/>
+              <a:t> </a:t>
+            </a:r>
+            <a:r>
+              <a:rPr lang="en-US" dirty="0" err="1"/>
+              <a:t>avand</a:t>
+            </a:r>
+            <a:r>
+              <a:rPr lang="en-US" dirty="0"/>
+              <a:t> in </a:t>
+            </a:r>
+            <a:r>
+              <a:rPr lang="en-US" dirty="0" err="1"/>
+              <a:t>vedere</a:t>
+            </a:r>
+            <a:r>
+              <a:rPr lang="en-US" dirty="0"/>
+              <a:t> </a:t>
+            </a:r>
+            <a:r>
+              <a:rPr lang="en-US" dirty="0" err="1"/>
+              <a:t>cresterea</a:t>
+            </a:r>
+            <a:r>
+              <a:rPr lang="en-US" dirty="0"/>
+              <a:t> </a:t>
+            </a:r>
+            <a:r>
+              <a:rPr lang="en-US" dirty="0" err="1"/>
+              <a:t>datelor</a:t>
+            </a:r>
+            <a:endParaRPr lang="en-US"/>
+          </a:p>
+          <a:p>
+            <a:endParaRPr lang="en-US"/>
+          </a:p>
+        </p:txBody>
+      </p:sp>
+      <p:sp>
+        <p:nvSpPr>
+          <p:cNvPr id="4" name="Slide Number Placeholder 3"/>
+          <p:cNvSpPr>
+            <a:spLocks noGrp="1"/>
+          </p:cNvSpPr>
+          <p:nvPr>
+            <p:ph type="sldNum" sz="quarter" idx="5"/>
+          </p:nvPr>
+        </p:nvSpPr>
+        <p:spPr/>
+        <p:txBody>
+          <a:bodyPr/>
+          <a:lstStyle/>
+          <a:p>
+            <a:fld id="{FB5F396E-3E4F-4108-B93C-ABCC834E1DEE}" type="slidenum">
+              <a:rPr lang="en-US" smtClean="0"/>
+              <a:t>23</a:t>
+            </a:fld>
+            <a:endParaRPr lang="en-US"/>
+          </a:p>
+        </p:txBody>
+      </p:sp>
+    </p:spTree>
+    <p:extLst>
+      <p:ext uri="{BB962C8B-B14F-4D97-AF65-F5344CB8AC3E}">
+        <p14:creationId xmlns:p14="http://schemas.microsoft.com/office/powerpoint/2010/main" val="4024023047"/>
       </p:ext>
     </p:extLst>
   </p:cSld>
@@ -8568,7 +8704,7 @@
           <a:p>
             <a:fld id="{BB2A6BCD-3E60-4707-91C2-DC5B8A6AF4C6}" type="datetimeFigureOut">
               <a:rPr lang="en-US" smtClean="0"/>
-              <a:t>26-Apr-20</a:t>
+              <a:t>13-May-20</a:t>
             </a:fld>
             <a:endParaRPr lang="en-US"/>
           </a:p>
@@ -8835,7 +8971,7 @@
           <a:p>
             <a:fld id="{BB2A6BCD-3E60-4707-91C2-DC5B8A6AF4C6}" type="datetimeFigureOut">
               <a:rPr lang="en-US" smtClean="0"/>
-              <a:t>26-Apr-20</a:t>
+              <a:t>13-May-20</a:t>
             </a:fld>
             <a:endParaRPr lang="en-US"/>
           </a:p>
@@ -9031,7 +9167,7 @@
           <a:p>
             <a:fld id="{BB2A6BCD-3E60-4707-91C2-DC5B8A6AF4C6}" type="datetimeFigureOut">
               <a:rPr lang="en-US" smtClean="0"/>
-              <a:t>26-Apr-20</a:t>
+              <a:t>13-May-20</a:t>
             </a:fld>
             <a:endParaRPr lang="en-US"/>
           </a:p>
@@ -9294,7 +9430,7 @@
           <a:p>
             <a:fld id="{BB2A6BCD-3E60-4707-91C2-DC5B8A6AF4C6}" type="datetimeFigureOut">
               <a:rPr lang="en-US" smtClean="0"/>
-              <a:t>26-Apr-20</a:t>
+              <a:t>13-May-20</a:t>
             </a:fld>
             <a:endParaRPr lang="en-US"/>
           </a:p>
@@ -9728,7 +9864,7 @@
           <a:p>
             <a:fld id="{BB2A6BCD-3E60-4707-91C2-DC5B8A6AF4C6}" type="datetimeFigureOut">
               <a:rPr lang="en-US" smtClean="0"/>
-              <a:t>26-Apr-20</a:t>
+              <a:t>13-May-20</a:t>
             </a:fld>
             <a:endParaRPr lang="en-US"/>
           </a:p>
@@ -10274,7 +10410,7 @@
           <a:p>
             <a:fld id="{BB2A6BCD-3E60-4707-91C2-DC5B8A6AF4C6}" type="datetimeFigureOut">
               <a:rPr lang="en-US" smtClean="0"/>
-              <a:t>26-Apr-20</a:t>
+              <a:t>13-May-20</a:t>
             </a:fld>
             <a:endParaRPr lang="en-US"/>
           </a:p>
@@ -10994,7 +11130,7 @@
           <a:p>
             <a:fld id="{BB2A6BCD-3E60-4707-91C2-DC5B8A6AF4C6}" type="datetimeFigureOut">
               <a:rPr lang="en-US" smtClean="0"/>
-              <a:t>26-Apr-20</a:t>
+              <a:t>13-May-20</a:t>
             </a:fld>
             <a:endParaRPr lang="en-US"/>
           </a:p>
@@ -11164,7 +11300,7 @@
           <a:p>
             <a:fld id="{BB2A6BCD-3E60-4707-91C2-DC5B8A6AF4C6}" type="datetimeFigureOut">
               <a:rPr lang="en-US" smtClean="0"/>
-              <a:t>26-Apr-20</a:t>
+              <a:t>13-May-20</a:t>
             </a:fld>
             <a:endParaRPr lang="en-US"/>
           </a:p>
@@ -11344,7 +11480,7 @@
           <a:p>
             <a:fld id="{BB2A6BCD-3E60-4707-91C2-DC5B8A6AF4C6}" type="datetimeFigureOut">
               <a:rPr lang="en-US" smtClean="0"/>
-              <a:t>26-Apr-20</a:t>
+              <a:t>13-May-20</a:t>
             </a:fld>
             <a:endParaRPr lang="en-US"/>
           </a:p>
@@ -11514,7 +11650,7 @@
           <a:p>
             <a:fld id="{BB2A6BCD-3E60-4707-91C2-DC5B8A6AF4C6}" type="datetimeFigureOut">
               <a:rPr lang="en-US" smtClean="0"/>
-              <a:t>26-Apr-20</a:t>
+              <a:t>13-May-20</a:t>
             </a:fld>
             <a:endParaRPr lang="en-US"/>
           </a:p>
@@ -11764,7 +11900,7 @@
           <a:p>
             <a:fld id="{BB2A6BCD-3E60-4707-91C2-DC5B8A6AF4C6}" type="datetimeFigureOut">
               <a:rPr lang="en-US" smtClean="0"/>
-              <a:t>26-Apr-20</a:t>
+              <a:t>13-May-20</a:t>
             </a:fld>
             <a:endParaRPr lang="en-US"/>
           </a:p>
@@ -11996,7 +12132,7 @@
           <a:p>
             <a:fld id="{BB2A6BCD-3E60-4707-91C2-DC5B8A6AF4C6}" type="datetimeFigureOut">
               <a:rPr lang="en-US" smtClean="0"/>
-              <a:t>26-Apr-20</a:t>
+              <a:t>13-May-20</a:t>
             </a:fld>
             <a:endParaRPr lang="en-US"/>
           </a:p>
@@ -12377,7 +12513,7 @@
           <a:p>
             <a:fld id="{BB2A6BCD-3E60-4707-91C2-DC5B8A6AF4C6}" type="datetimeFigureOut">
               <a:rPr lang="en-US" smtClean="0"/>
-              <a:t>26-Apr-20</a:t>
+              <a:t>13-May-20</a:t>
             </a:fld>
             <a:endParaRPr lang="en-US"/>
           </a:p>
@@ -12495,7 +12631,7 @@
           <a:p>
             <a:fld id="{BB2A6BCD-3E60-4707-91C2-DC5B8A6AF4C6}" type="datetimeFigureOut">
               <a:rPr lang="en-US" smtClean="0"/>
-              <a:t>26-Apr-20</a:t>
+              <a:t>13-May-20</a:t>
             </a:fld>
             <a:endParaRPr lang="en-US"/>
           </a:p>
@@ -12590,7 +12726,7 @@
           <a:p>
             <a:fld id="{BB2A6BCD-3E60-4707-91C2-DC5B8A6AF4C6}" type="datetimeFigureOut">
               <a:rPr lang="en-US" smtClean="0"/>
-              <a:t>26-Apr-20</a:t>
+              <a:t>13-May-20</a:t>
             </a:fld>
             <a:endParaRPr lang="en-US"/>
           </a:p>
@@ -12839,7 +12975,7 @@
           <a:p>
             <a:fld id="{BB2A6BCD-3E60-4707-91C2-DC5B8A6AF4C6}" type="datetimeFigureOut">
               <a:rPr lang="en-US" smtClean="0"/>
-              <a:t>26-Apr-20</a:t>
+              <a:t>13-May-20</a:t>
             </a:fld>
             <a:endParaRPr lang="en-US"/>
           </a:p>
@@ -13119,7 +13255,7 @@
           <a:p>
             <a:fld id="{BB2A6BCD-3E60-4707-91C2-DC5B8A6AF4C6}" type="datetimeFigureOut">
               <a:rPr lang="en-US" smtClean="0"/>
-              <a:t>26-Apr-20</a:t>
+              <a:t>13-May-20</a:t>
             </a:fld>
             <a:endParaRPr lang="en-US"/>
           </a:p>
@@ -16196,7 +16332,7 @@
           <a:p>
             <a:fld id="{BB2A6BCD-3E60-4707-91C2-DC5B8A6AF4C6}" type="datetimeFigureOut">
               <a:rPr lang="en-US" smtClean="0"/>
-              <a:t>26-Apr-20</a:t>
+              <a:t>13-May-20</a:t>
             </a:fld>
             <a:endParaRPr lang="en-US"/>
           </a:p>
@@ -19600,7 +19736,7 @@
           <p:nvPr/>
         </p:nvPicPr>
         <p:blipFill>
-          <a:blip r:embed="rId2">
+          <a:blip r:embed="rId3">
             <a:extLst>
               <a:ext uri="{28A0092B-C50C-407E-A947-70E740481C1C}">
                 <a14:useLocalDpi xmlns:a14="http://schemas.microsoft.com/office/drawing/2010/main" val="0"/>

</xml_diff>